<commit_message>
Project zu "gitlab" geändert, vorher war der Pfad zu lang.
</commit_message>
<xml_diff>
--- a/slides/Tag-3_3-Container-Registry.pptx
+++ b/slides/Tag-3_3-Container-Registry.pptx
@@ -9296,9 +9296,10 @@
               <a:t>Project: </a:t>
             </a:r>
             <a:r>
-              <a:rPr lang="nl-NL" dirty="0"/>
-              <a:t>gitlab.ads.anderscore.com/trainings/gitlab</a:t>
-            </a:r>
+              <a:rPr lang="nl-NL"/>
+              <a:t>gitlab</a:t>
+            </a:r>
+            <a:endParaRPr lang="nl-NL" dirty="0"/>
           </a:p>
           <a:p>
             <a:pPr>

</xml_diff>

<commit_message>
Demo-Sticker auf Slides hinzugefügt, deren Inhalt in einer Live-Demo gezeigt werden
</commit_message>
<xml_diff>
--- a/slides/Tag-3_3-Container-Registry.pptx
+++ b/slides/Tag-3_3-Container-Registry.pptx
@@ -2636,7 +2636,7 @@
               <a:pPr algn="ctr">
                 <a:defRPr/>
               </a:pPr>
-              <a:t>10.06.2024</a:t>
+              <a:t>11.06.2024</a:t>
             </a:fld>
             <a:endParaRPr lang="de-DE" sz="1000">
               <a:solidFill>
@@ -5457,6 +5457,42 @@
           </a:p>
         </p:txBody>
       </p:sp>
+      <p:pic>
+        <p:nvPicPr>
+          <p:cNvPr id="4" name="Grafik 3">
+            <a:extLst>
+              <a:ext uri="{FF2B5EF4-FFF2-40B4-BE49-F238E27FC236}">
+                <a16:creationId xmlns:a16="http://schemas.microsoft.com/office/drawing/2014/main" id="{22016768-7191-0221-F4CF-EF28968B887D}"/>
+              </a:ext>
+            </a:extLst>
+          </p:cNvPr>
+          <p:cNvPicPr>
+            <a:picLocks noChangeAspect="1"/>
+          </p:cNvPicPr>
+          <p:nvPr/>
+        </p:nvPicPr>
+        <p:blipFill>
+          <a:blip r:embed="rId2">
+            <a:extLst>
+              <a:ext uri="{28A0092B-C50C-407E-A947-70E740481C1C}">
+                <a14:useLocalDpi xmlns:a14="http://schemas.microsoft.com/office/drawing/2010/main" val="0"/>
+              </a:ext>
+            </a:extLst>
+          </a:blip>
+          <a:stretch>
+            <a:fillRect/>
+          </a:stretch>
+        </p:blipFill>
+        <p:spPr>
+          <a:xfrm rot="20304935">
+            <a:off x="7184622" y="5554276"/>
+            <a:ext cx="2227108" cy="926566"/>
+          </a:xfrm>
+          <a:prstGeom prst="rect">
+            <a:avLst/>
+          </a:prstGeom>
+        </p:spPr>
+      </p:pic>
     </p:spTree>
     <p:extLst>
       <p:ext uri="{BB962C8B-B14F-4D97-AF65-F5344CB8AC3E}">
@@ -5662,6 +5698,42 @@
           </a:p>
         </p:txBody>
       </p:sp>
+      <p:pic>
+        <p:nvPicPr>
+          <p:cNvPr id="4" name="Grafik 3">
+            <a:extLst>
+              <a:ext uri="{FF2B5EF4-FFF2-40B4-BE49-F238E27FC236}">
+                <a16:creationId xmlns:a16="http://schemas.microsoft.com/office/drawing/2014/main" id="{CD729B85-DC8E-F2D1-A2CC-60C289AF9140}"/>
+              </a:ext>
+            </a:extLst>
+          </p:cNvPr>
+          <p:cNvPicPr>
+            <a:picLocks noChangeAspect="1"/>
+          </p:cNvPicPr>
+          <p:nvPr/>
+        </p:nvPicPr>
+        <p:blipFill>
+          <a:blip r:embed="rId3">
+            <a:extLst>
+              <a:ext uri="{28A0092B-C50C-407E-A947-70E740481C1C}">
+                <a14:useLocalDpi xmlns:a14="http://schemas.microsoft.com/office/drawing/2010/main" val="0"/>
+              </a:ext>
+            </a:extLst>
+          </a:blip>
+          <a:stretch>
+            <a:fillRect/>
+          </a:stretch>
+        </p:blipFill>
+        <p:spPr>
+          <a:xfrm rot="20304935">
+            <a:off x="7184622" y="5554276"/>
+            <a:ext cx="2227108" cy="926566"/>
+          </a:xfrm>
+          <a:prstGeom prst="rect">
+            <a:avLst/>
+          </a:prstGeom>
+        </p:spPr>
+      </p:pic>
     </p:spTree>
     <p:extLst>
       <p:ext uri="{BB962C8B-B14F-4D97-AF65-F5344CB8AC3E}">
@@ -5753,6 +5825,42 @@
             <a:off x="2082474" y="981075"/>
             <a:ext cx="4958415" cy="5400675"/>
           </a:xfrm>
+        </p:spPr>
+      </p:pic>
+      <p:pic>
+        <p:nvPicPr>
+          <p:cNvPr id="3" name="Grafik 2">
+            <a:extLst>
+              <a:ext uri="{FF2B5EF4-FFF2-40B4-BE49-F238E27FC236}">
+                <a16:creationId xmlns:a16="http://schemas.microsoft.com/office/drawing/2014/main" id="{06C301D4-6B7D-12AE-3A69-DFF7C4589FB8}"/>
+              </a:ext>
+            </a:extLst>
+          </p:cNvPr>
+          <p:cNvPicPr>
+            <a:picLocks noChangeAspect="1"/>
+          </p:cNvPicPr>
+          <p:nvPr/>
+        </p:nvPicPr>
+        <p:blipFill>
+          <a:blip r:embed="rId3">
+            <a:extLst>
+              <a:ext uri="{28A0092B-C50C-407E-A947-70E740481C1C}">
+                <a14:useLocalDpi xmlns:a14="http://schemas.microsoft.com/office/drawing/2010/main" val="0"/>
+              </a:ext>
+            </a:extLst>
+          </a:blip>
+          <a:stretch>
+            <a:fillRect/>
+          </a:stretch>
+        </p:blipFill>
+        <p:spPr>
+          <a:xfrm rot="20304935">
+            <a:off x="7184622" y="5554276"/>
+            <a:ext cx="2227108" cy="926566"/>
+          </a:xfrm>
+          <a:prstGeom prst="rect">
+            <a:avLst/>
+          </a:prstGeom>
         </p:spPr>
       </p:pic>
     </p:spTree>
@@ -6033,6 +6141,42 @@
           </a:p>
         </p:txBody>
       </p:sp>
+      <p:pic>
+        <p:nvPicPr>
+          <p:cNvPr id="4" name="Grafik 3">
+            <a:extLst>
+              <a:ext uri="{FF2B5EF4-FFF2-40B4-BE49-F238E27FC236}">
+                <a16:creationId xmlns:a16="http://schemas.microsoft.com/office/drawing/2014/main" id="{181BF95F-C38C-A100-E2E8-4C36F77BEC36}"/>
+              </a:ext>
+            </a:extLst>
+          </p:cNvPr>
+          <p:cNvPicPr>
+            <a:picLocks noChangeAspect="1"/>
+          </p:cNvPicPr>
+          <p:nvPr/>
+        </p:nvPicPr>
+        <p:blipFill>
+          <a:blip r:embed="rId2">
+            <a:extLst>
+              <a:ext uri="{28A0092B-C50C-407E-A947-70E740481C1C}">
+                <a14:useLocalDpi xmlns:a14="http://schemas.microsoft.com/office/drawing/2010/main" val="0"/>
+              </a:ext>
+            </a:extLst>
+          </a:blip>
+          <a:stretch>
+            <a:fillRect/>
+          </a:stretch>
+        </p:blipFill>
+        <p:spPr>
+          <a:xfrm rot="20304935">
+            <a:off x="7184622" y="5554276"/>
+            <a:ext cx="2227108" cy="926566"/>
+          </a:xfrm>
+          <a:prstGeom prst="rect">
+            <a:avLst/>
+          </a:prstGeom>
+        </p:spPr>
+      </p:pic>
     </p:spTree>
     <p:extLst>
       <p:ext uri="{BB962C8B-B14F-4D97-AF65-F5344CB8AC3E}">
@@ -7037,6 +7181,42 @@
           </a:p>
         </p:txBody>
       </p:sp>
+      <p:pic>
+        <p:nvPicPr>
+          <p:cNvPr id="4" name="Grafik 3">
+            <a:extLst>
+              <a:ext uri="{FF2B5EF4-FFF2-40B4-BE49-F238E27FC236}">
+                <a16:creationId xmlns:a16="http://schemas.microsoft.com/office/drawing/2014/main" id="{A7E4C755-4508-BFC7-A777-BDC679016D8C}"/>
+              </a:ext>
+            </a:extLst>
+          </p:cNvPr>
+          <p:cNvPicPr>
+            <a:picLocks noChangeAspect="1"/>
+          </p:cNvPicPr>
+          <p:nvPr/>
+        </p:nvPicPr>
+        <p:blipFill>
+          <a:blip r:embed="rId3">
+            <a:extLst>
+              <a:ext uri="{28A0092B-C50C-407E-A947-70E740481C1C}">
+                <a14:useLocalDpi xmlns:a14="http://schemas.microsoft.com/office/drawing/2010/main" val="0"/>
+              </a:ext>
+            </a:extLst>
+          </a:blip>
+          <a:stretch>
+            <a:fillRect/>
+          </a:stretch>
+        </p:blipFill>
+        <p:spPr>
+          <a:xfrm rot="20304935">
+            <a:off x="7184622" y="5554276"/>
+            <a:ext cx="2227108" cy="926566"/>
+          </a:xfrm>
+          <a:prstGeom prst="rect">
+            <a:avLst/>
+          </a:prstGeom>
+        </p:spPr>
+      </p:pic>
     </p:spTree>
     <p:extLst>
       <p:ext uri="{BB962C8B-B14F-4D97-AF65-F5344CB8AC3E}">
@@ -7128,6 +7308,42 @@
             <a:off x="508228" y="1152172"/>
             <a:ext cx="8106906" cy="5058481"/>
           </a:xfrm>
+        </p:spPr>
+      </p:pic>
+      <p:pic>
+        <p:nvPicPr>
+          <p:cNvPr id="3" name="Grafik 2">
+            <a:extLst>
+              <a:ext uri="{FF2B5EF4-FFF2-40B4-BE49-F238E27FC236}">
+                <a16:creationId xmlns:a16="http://schemas.microsoft.com/office/drawing/2014/main" id="{FA79D1FF-DE5F-A244-1F42-796F0B274299}"/>
+              </a:ext>
+            </a:extLst>
+          </p:cNvPr>
+          <p:cNvPicPr>
+            <a:picLocks noChangeAspect="1"/>
+          </p:cNvPicPr>
+          <p:nvPr/>
+        </p:nvPicPr>
+        <p:blipFill>
+          <a:blip r:embed="rId3">
+            <a:extLst>
+              <a:ext uri="{28A0092B-C50C-407E-A947-70E740481C1C}">
+                <a14:useLocalDpi xmlns:a14="http://schemas.microsoft.com/office/drawing/2010/main" val="0"/>
+              </a:ext>
+            </a:extLst>
+          </a:blip>
+          <a:stretch>
+            <a:fillRect/>
+          </a:stretch>
+        </p:blipFill>
+        <p:spPr>
+          <a:xfrm rot="20304935">
+            <a:off x="7184622" y="5554276"/>
+            <a:ext cx="2227108" cy="926566"/>
+          </a:xfrm>
+          <a:prstGeom prst="rect">
+            <a:avLst/>
+          </a:prstGeom>
         </p:spPr>
       </p:pic>
     </p:spTree>
@@ -7452,6 +7668,42 @@
           </a:p>
         </p:txBody>
       </p:sp>
+      <p:pic>
+        <p:nvPicPr>
+          <p:cNvPr id="4" name="Grafik 3">
+            <a:extLst>
+              <a:ext uri="{FF2B5EF4-FFF2-40B4-BE49-F238E27FC236}">
+                <a16:creationId xmlns:a16="http://schemas.microsoft.com/office/drawing/2014/main" id="{82C27384-2093-5734-93DA-53DA8449E971}"/>
+              </a:ext>
+            </a:extLst>
+          </p:cNvPr>
+          <p:cNvPicPr>
+            <a:picLocks noChangeAspect="1"/>
+          </p:cNvPicPr>
+          <p:nvPr/>
+        </p:nvPicPr>
+        <p:blipFill>
+          <a:blip r:embed="rId2">
+            <a:extLst>
+              <a:ext uri="{28A0092B-C50C-407E-A947-70E740481C1C}">
+                <a14:useLocalDpi xmlns:a14="http://schemas.microsoft.com/office/drawing/2010/main" val="0"/>
+              </a:ext>
+            </a:extLst>
+          </a:blip>
+          <a:stretch>
+            <a:fillRect/>
+          </a:stretch>
+        </p:blipFill>
+        <p:spPr>
+          <a:xfrm rot="20304935">
+            <a:off x="7184622" y="5554276"/>
+            <a:ext cx="2227108" cy="926566"/>
+          </a:xfrm>
+          <a:prstGeom prst="rect">
+            <a:avLst/>
+          </a:prstGeom>
+        </p:spPr>
+      </p:pic>
     </p:spTree>
     <p:extLst>
       <p:ext uri="{BB962C8B-B14F-4D97-AF65-F5344CB8AC3E}">
@@ -8107,6 +8359,42 @@
           </a:p>
         </p:txBody>
       </p:sp>
+      <p:pic>
+        <p:nvPicPr>
+          <p:cNvPr id="5" name="Grafik 4">
+            <a:extLst>
+              <a:ext uri="{FF2B5EF4-FFF2-40B4-BE49-F238E27FC236}">
+                <a16:creationId xmlns:a16="http://schemas.microsoft.com/office/drawing/2014/main" id="{3DFBEF03-FAE1-0412-E52B-E79BE36FFBD9}"/>
+              </a:ext>
+            </a:extLst>
+          </p:cNvPr>
+          <p:cNvPicPr>
+            <a:picLocks noChangeAspect="1"/>
+          </p:cNvPicPr>
+          <p:nvPr/>
+        </p:nvPicPr>
+        <p:blipFill>
+          <a:blip r:embed="rId2">
+            <a:extLst>
+              <a:ext uri="{28A0092B-C50C-407E-A947-70E740481C1C}">
+                <a14:useLocalDpi xmlns:a14="http://schemas.microsoft.com/office/drawing/2010/main" val="0"/>
+              </a:ext>
+            </a:extLst>
+          </a:blip>
+          <a:stretch>
+            <a:fillRect/>
+          </a:stretch>
+        </p:blipFill>
+        <p:spPr>
+          <a:xfrm rot="20304935">
+            <a:off x="7184622" y="5554276"/>
+            <a:ext cx="2227108" cy="926566"/>
+          </a:xfrm>
+          <a:prstGeom prst="rect">
+            <a:avLst/>
+          </a:prstGeom>
+        </p:spPr>
+      </p:pic>
     </p:spTree>
     <p:extLst>
       <p:ext uri="{BB962C8B-B14F-4D97-AF65-F5344CB8AC3E}">
@@ -8286,6 +8574,42 @@
           </a:p>
         </p:txBody>
       </p:sp>
+      <p:pic>
+        <p:nvPicPr>
+          <p:cNvPr id="4" name="Grafik 3">
+            <a:extLst>
+              <a:ext uri="{FF2B5EF4-FFF2-40B4-BE49-F238E27FC236}">
+                <a16:creationId xmlns:a16="http://schemas.microsoft.com/office/drawing/2014/main" id="{52AA1117-485A-50FC-A85C-C9A141774681}"/>
+              </a:ext>
+            </a:extLst>
+          </p:cNvPr>
+          <p:cNvPicPr>
+            <a:picLocks noChangeAspect="1"/>
+          </p:cNvPicPr>
+          <p:nvPr/>
+        </p:nvPicPr>
+        <p:blipFill>
+          <a:blip r:embed="rId2">
+            <a:extLst>
+              <a:ext uri="{28A0092B-C50C-407E-A947-70E740481C1C}">
+                <a14:useLocalDpi xmlns:a14="http://schemas.microsoft.com/office/drawing/2010/main" val="0"/>
+              </a:ext>
+            </a:extLst>
+          </a:blip>
+          <a:stretch>
+            <a:fillRect/>
+          </a:stretch>
+        </p:blipFill>
+        <p:spPr>
+          <a:xfrm rot="20304935">
+            <a:off x="7184622" y="5554276"/>
+            <a:ext cx="2227108" cy="926566"/>
+          </a:xfrm>
+          <a:prstGeom prst="rect">
+            <a:avLst/>
+          </a:prstGeom>
+        </p:spPr>
+      </p:pic>
     </p:spTree>
     <p:extLst>
       <p:ext uri="{BB962C8B-B14F-4D97-AF65-F5344CB8AC3E}">
@@ -8377,6 +8701,42 @@
             <a:off x="1541835" y="1142645"/>
             <a:ext cx="6039693" cy="5077534"/>
           </a:xfrm>
+        </p:spPr>
+      </p:pic>
+      <p:pic>
+        <p:nvPicPr>
+          <p:cNvPr id="3" name="Grafik 2">
+            <a:extLst>
+              <a:ext uri="{FF2B5EF4-FFF2-40B4-BE49-F238E27FC236}">
+                <a16:creationId xmlns:a16="http://schemas.microsoft.com/office/drawing/2014/main" id="{9A0EDDD4-68C0-AFEE-0A29-99494A26C36D}"/>
+              </a:ext>
+            </a:extLst>
+          </p:cNvPr>
+          <p:cNvPicPr>
+            <a:picLocks noChangeAspect="1"/>
+          </p:cNvPicPr>
+          <p:nvPr/>
+        </p:nvPicPr>
+        <p:blipFill>
+          <a:blip r:embed="rId4">
+            <a:extLst>
+              <a:ext uri="{28A0092B-C50C-407E-A947-70E740481C1C}">
+                <a14:useLocalDpi xmlns:a14="http://schemas.microsoft.com/office/drawing/2010/main" val="0"/>
+              </a:ext>
+            </a:extLst>
+          </a:blip>
+          <a:stretch>
+            <a:fillRect/>
+          </a:stretch>
+        </p:blipFill>
+        <p:spPr>
+          <a:xfrm rot="20304935">
+            <a:off x="7184622" y="5554276"/>
+            <a:ext cx="2227108" cy="926566"/>
+          </a:xfrm>
+          <a:prstGeom prst="rect">
+            <a:avLst/>
+          </a:prstGeom>
         </p:spPr>
       </p:pic>
     </p:spTree>
@@ -8472,6 +8832,42 @@
           </a:xfrm>
         </p:spPr>
       </p:pic>
+      <p:pic>
+        <p:nvPicPr>
+          <p:cNvPr id="3" name="Grafik 2">
+            <a:extLst>
+              <a:ext uri="{FF2B5EF4-FFF2-40B4-BE49-F238E27FC236}">
+                <a16:creationId xmlns:a16="http://schemas.microsoft.com/office/drawing/2014/main" id="{734AC504-15F0-C406-DD48-C1C3D912F743}"/>
+              </a:ext>
+            </a:extLst>
+          </p:cNvPr>
+          <p:cNvPicPr>
+            <a:picLocks noChangeAspect="1"/>
+          </p:cNvPicPr>
+          <p:nvPr/>
+        </p:nvPicPr>
+        <p:blipFill>
+          <a:blip r:embed="rId4">
+            <a:extLst>
+              <a:ext uri="{28A0092B-C50C-407E-A947-70E740481C1C}">
+                <a14:useLocalDpi xmlns:a14="http://schemas.microsoft.com/office/drawing/2010/main" val="0"/>
+              </a:ext>
+            </a:extLst>
+          </a:blip>
+          <a:stretch>
+            <a:fillRect/>
+          </a:stretch>
+        </p:blipFill>
+        <p:spPr>
+          <a:xfrm rot="20304935">
+            <a:off x="7184622" y="5554276"/>
+            <a:ext cx="2227108" cy="926566"/>
+          </a:xfrm>
+          <a:prstGeom prst="rect">
+            <a:avLst/>
+          </a:prstGeom>
+        </p:spPr>
+      </p:pic>
     </p:spTree>
     <p:extLst>
       <p:ext uri="{BB962C8B-B14F-4D97-AF65-F5344CB8AC3E}">
@@ -8622,6 +9018,42 @@
           </a:p>
         </p:txBody>
       </p:sp>
+      <p:pic>
+        <p:nvPicPr>
+          <p:cNvPr id="4" name="Grafik 3">
+            <a:extLst>
+              <a:ext uri="{FF2B5EF4-FFF2-40B4-BE49-F238E27FC236}">
+                <a16:creationId xmlns:a16="http://schemas.microsoft.com/office/drawing/2014/main" id="{048AF64D-AA8A-5EB0-C992-06768C7185DF}"/>
+              </a:ext>
+            </a:extLst>
+          </p:cNvPr>
+          <p:cNvPicPr>
+            <a:picLocks noChangeAspect="1"/>
+          </p:cNvPicPr>
+          <p:nvPr/>
+        </p:nvPicPr>
+        <p:blipFill>
+          <a:blip r:embed="rId2">
+            <a:extLst>
+              <a:ext uri="{28A0092B-C50C-407E-A947-70E740481C1C}">
+                <a14:useLocalDpi xmlns:a14="http://schemas.microsoft.com/office/drawing/2010/main" val="0"/>
+              </a:ext>
+            </a:extLst>
+          </a:blip>
+          <a:stretch>
+            <a:fillRect/>
+          </a:stretch>
+        </p:blipFill>
+        <p:spPr>
+          <a:xfrm rot="20304935">
+            <a:off x="7184622" y="5554276"/>
+            <a:ext cx="2227108" cy="926566"/>
+          </a:xfrm>
+          <a:prstGeom prst="rect">
+            <a:avLst/>
+          </a:prstGeom>
+        </p:spPr>
+      </p:pic>
     </p:spTree>
     <p:extLst>
       <p:ext uri="{BB962C8B-B14F-4D97-AF65-F5344CB8AC3E}">
@@ -8973,6 +9405,42 @@
           <a:xfrm>
             <a:off x="6948264" y="2780928"/>
             <a:ext cx="1716164" cy="1599418"/>
+          </a:xfrm>
+          <a:prstGeom prst="rect">
+            <a:avLst/>
+          </a:prstGeom>
+        </p:spPr>
+      </p:pic>
+      <p:pic>
+        <p:nvPicPr>
+          <p:cNvPr id="4" name="Grafik 3">
+            <a:extLst>
+              <a:ext uri="{FF2B5EF4-FFF2-40B4-BE49-F238E27FC236}">
+                <a16:creationId xmlns:a16="http://schemas.microsoft.com/office/drawing/2014/main" id="{BCF1DA45-EDE7-3086-F2F1-8106D0180DCB}"/>
+              </a:ext>
+            </a:extLst>
+          </p:cNvPr>
+          <p:cNvPicPr>
+            <a:picLocks noChangeAspect="1"/>
+          </p:cNvPicPr>
+          <p:nvPr/>
+        </p:nvPicPr>
+        <p:blipFill>
+          <a:blip r:embed="rId4">
+            <a:extLst>
+              <a:ext uri="{28A0092B-C50C-407E-A947-70E740481C1C}">
+                <a14:useLocalDpi xmlns:a14="http://schemas.microsoft.com/office/drawing/2010/main" val="0"/>
+              </a:ext>
+            </a:extLst>
+          </a:blip>
+          <a:stretch>
+            <a:fillRect/>
+          </a:stretch>
+        </p:blipFill>
+        <p:spPr>
+          <a:xfrm rot="20304935">
+            <a:off x="7184622" y="5554276"/>
+            <a:ext cx="2227108" cy="926566"/>
           </a:xfrm>
           <a:prstGeom prst="rect">
             <a:avLst/>
@@ -10313,6 +10781,42 @@
           </a:p>
         </p:txBody>
       </p:sp>
+      <p:pic>
+        <p:nvPicPr>
+          <p:cNvPr id="4" name="Grafik 3">
+            <a:extLst>
+              <a:ext uri="{FF2B5EF4-FFF2-40B4-BE49-F238E27FC236}">
+                <a16:creationId xmlns:a16="http://schemas.microsoft.com/office/drawing/2014/main" id="{6F902AE6-BF4C-7611-1ED5-C74892A8E706}"/>
+              </a:ext>
+            </a:extLst>
+          </p:cNvPr>
+          <p:cNvPicPr>
+            <a:picLocks noChangeAspect="1"/>
+          </p:cNvPicPr>
+          <p:nvPr/>
+        </p:nvPicPr>
+        <p:blipFill>
+          <a:blip r:embed="rId2">
+            <a:extLst>
+              <a:ext uri="{28A0092B-C50C-407E-A947-70E740481C1C}">
+                <a14:useLocalDpi xmlns:a14="http://schemas.microsoft.com/office/drawing/2010/main" val="0"/>
+              </a:ext>
+            </a:extLst>
+          </a:blip>
+          <a:stretch>
+            <a:fillRect/>
+          </a:stretch>
+        </p:blipFill>
+        <p:spPr>
+          <a:xfrm rot="20304935">
+            <a:off x="7184622" y="5554276"/>
+            <a:ext cx="2227108" cy="926566"/>
+          </a:xfrm>
+          <a:prstGeom prst="rect">
+            <a:avLst/>
+          </a:prstGeom>
+        </p:spPr>
+      </p:pic>
     </p:spTree>
     <p:extLst>
       <p:ext uri="{BB962C8B-B14F-4D97-AF65-F5344CB8AC3E}">
@@ -10567,6 +11071,42 @@
           </a:p>
         </p:txBody>
       </p:sp>
+      <p:pic>
+        <p:nvPicPr>
+          <p:cNvPr id="4" name="Grafik 3">
+            <a:extLst>
+              <a:ext uri="{FF2B5EF4-FFF2-40B4-BE49-F238E27FC236}">
+                <a16:creationId xmlns:a16="http://schemas.microsoft.com/office/drawing/2014/main" id="{567AA1B6-5E7D-FABE-E055-7F6917021299}"/>
+              </a:ext>
+            </a:extLst>
+          </p:cNvPr>
+          <p:cNvPicPr>
+            <a:picLocks noChangeAspect="1"/>
+          </p:cNvPicPr>
+          <p:nvPr/>
+        </p:nvPicPr>
+        <p:blipFill>
+          <a:blip r:embed="rId2">
+            <a:extLst>
+              <a:ext uri="{28A0092B-C50C-407E-A947-70E740481C1C}">
+                <a14:useLocalDpi xmlns:a14="http://schemas.microsoft.com/office/drawing/2010/main" val="0"/>
+              </a:ext>
+            </a:extLst>
+          </a:blip>
+          <a:stretch>
+            <a:fillRect/>
+          </a:stretch>
+        </p:blipFill>
+        <p:spPr>
+          <a:xfrm rot="20304935">
+            <a:off x="7184622" y="5554276"/>
+            <a:ext cx="2227108" cy="926566"/>
+          </a:xfrm>
+          <a:prstGeom prst="rect">
+            <a:avLst/>
+          </a:prstGeom>
+        </p:spPr>
+      </p:pic>
     </p:spTree>
     <p:extLst>
       <p:ext uri="{BB962C8B-B14F-4D97-AF65-F5344CB8AC3E}">
@@ -10717,6 +11257,42 @@
           </a:p>
         </p:txBody>
       </p:sp>
+      <p:pic>
+        <p:nvPicPr>
+          <p:cNvPr id="4" name="Grafik 3">
+            <a:extLst>
+              <a:ext uri="{FF2B5EF4-FFF2-40B4-BE49-F238E27FC236}">
+                <a16:creationId xmlns:a16="http://schemas.microsoft.com/office/drawing/2014/main" id="{69695A5F-42BD-B0A5-B41E-BA92F8E6A481}"/>
+              </a:ext>
+            </a:extLst>
+          </p:cNvPr>
+          <p:cNvPicPr>
+            <a:picLocks noChangeAspect="1"/>
+          </p:cNvPicPr>
+          <p:nvPr/>
+        </p:nvPicPr>
+        <p:blipFill>
+          <a:blip r:embed="rId2">
+            <a:extLst>
+              <a:ext uri="{28A0092B-C50C-407E-A947-70E740481C1C}">
+                <a14:useLocalDpi xmlns:a14="http://schemas.microsoft.com/office/drawing/2010/main" val="0"/>
+              </a:ext>
+            </a:extLst>
+          </a:blip>
+          <a:stretch>
+            <a:fillRect/>
+          </a:stretch>
+        </p:blipFill>
+        <p:spPr>
+          <a:xfrm rot="20304935">
+            <a:off x="7184622" y="5554276"/>
+            <a:ext cx="2227108" cy="926566"/>
+          </a:xfrm>
+          <a:prstGeom prst="rect">
+            <a:avLst/>
+          </a:prstGeom>
+        </p:spPr>
+      </p:pic>
     </p:spTree>
     <p:extLst>
       <p:ext uri="{BB962C8B-B14F-4D97-AF65-F5344CB8AC3E}">
@@ -11038,6 +11614,42 @@
           </a:p>
         </p:txBody>
       </p:sp>
+      <p:pic>
+        <p:nvPicPr>
+          <p:cNvPr id="4" name="Grafik 3">
+            <a:extLst>
+              <a:ext uri="{FF2B5EF4-FFF2-40B4-BE49-F238E27FC236}">
+                <a16:creationId xmlns:a16="http://schemas.microsoft.com/office/drawing/2014/main" id="{F15D8B8D-15E2-1F78-0EBE-664E90CDA0B9}"/>
+              </a:ext>
+            </a:extLst>
+          </p:cNvPr>
+          <p:cNvPicPr>
+            <a:picLocks noChangeAspect="1"/>
+          </p:cNvPicPr>
+          <p:nvPr/>
+        </p:nvPicPr>
+        <p:blipFill>
+          <a:blip r:embed="rId2">
+            <a:extLst>
+              <a:ext uri="{28A0092B-C50C-407E-A947-70E740481C1C}">
+                <a14:useLocalDpi xmlns:a14="http://schemas.microsoft.com/office/drawing/2010/main" val="0"/>
+              </a:ext>
+            </a:extLst>
+          </a:blip>
+          <a:stretch>
+            <a:fillRect/>
+          </a:stretch>
+        </p:blipFill>
+        <p:spPr>
+          <a:xfrm rot="20304935">
+            <a:off x="7184622" y="5554276"/>
+            <a:ext cx="2227108" cy="926566"/>
+          </a:xfrm>
+          <a:prstGeom prst="rect">
+            <a:avLst/>
+          </a:prstGeom>
+        </p:spPr>
+      </p:pic>
     </p:spTree>
     <p:extLst>
       <p:ext uri="{BB962C8B-B14F-4D97-AF65-F5344CB8AC3E}">

</xml_diff>